<commit_message>
added data collection to third presentation
</commit_message>
<xml_diff>
--- a/Presentations/ThirdPresentation.pptx
+++ b/Presentations/ThirdPresentation.pptx
@@ -5,14 +5,15 @@
     <p:sldMasterId id="2147483648" r:id="rId1"/>
   </p:sldMasterIdLst>
   <p:notesMasterIdLst>
-    <p:notesMasterId r:id="rId7"/>
+    <p:notesMasterId r:id="rId8"/>
   </p:notesMasterIdLst>
   <p:sldIdLst>
     <p:sldId id="259" r:id="rId2"/>
     <p:sldId id="260" r:id="rId3"/>
     <p:sldId id="261" r:id="rId4"/>
     <p:sldId id="264" r:id="rId5"/>
-    <p:sldId id="263" r:id="rId6"/>
+    <p:sldId id="265" r:id="rId6"/>
+    <p:sldId id="263" r:id="rId7"/>
   </p:sldIdLst>
   <p:sldSz cx="9144000" cy="5143500" type="screen16x9"/>
   <p:notesSz cx="6858000" cy="9144000"/>
@@ -491,6 +492,90 @@
     </a:lvl9pPr>
   </p:notesStyle>
 </p:notesMaster>
+</file>
+
+<file path=ppt/notesSlides/notesSlide1.xml><?xml version="1.0" encoding="utf-8"?>
+<p:notes xmlns:a="http://schemas.openxmlformats.org/drawingml/2006/main" xmlns:r="http://schemas.openxmlformats.org/officeDocument/2006/relationships" xmlns:p="http://schemas.openxmlformats.org/presentationml/2006/main">
+  <p:cSld>
+    <p:spTree>
+      <p:nvGrpSpPr>
+        <p:cNvPr id="1" name=""/>
+        <p:cNvGrpSpPr/>
+        <p:nvPr/>
+      </p:nvGrpSpPr>
+      <p:grpSpPr>
+        <a:xfrm>
+          <a:off x="0" y="0"/>
+          <a:ext cx="0" cy="0"/>
+          <a:chOff x="0" y="0"/>
+          <a:chExt cx="0" cy="0"/>
+        </a:xfrm>
+      </p:grpSpPr>
+      <p:sp>
+        <p:nvSpPr>
+          <p:cNvPr id="2" name="Folienbildplatzhalter 1"/>
+          <p:cNvSpPr>
+            <a:spLocks noGrp="1" noRot="1" noChangeAspect="1"/>
+          </p:cNvSpPr>
+          <p:nvPr>
+            <p:ph type="sldImg"/>
+          </p:nvPr>
+        </p:nvSpPr>
+        <p:spPr/>
+      </p:sp>
+      <p:sp>
+        <p:nvSpPr>
+          <p:cNvPr id="3" name="Notizenplatzhalter 2"/>
+          <p:cNvSpPr>
+            <a:spLocks noGrp="1"/>
+          </p:cNvSpPr>
+          <p:nvPr>
+            <p:ph type="body" idx="1"/>
+          </p:nvPr>
+        </p:nvSpPr>
+        <p:spPr/>
+        <p:txBody>
+          <a:bodyPr/>
+          <a:lstStyle/>
+          <a:p>
+            <a:endParaRPr lang="en-DE" dirty="0"/>
+          </a:p>
+        </p:txBody>
+      </p:sp>
+      <p:sp>
+        <p:nvSpPr>
+          <p:cNvPr id="4" name="Foliennummernplatzhalter 3"/>
+          <p:cNvSpPr>
+            <a:spLocks noGrp="1"/>
+          </p:cNvSpPr>
+          <p:nvPr>
+            <p:ph type="sldNum" sz="quarter" idx="5"/>
+          </p:nvPr>
+        </p:nvSpPr>
+        <p:spPr/>
+        <p:txBody>
+          <a:bodyPr/>
+          <a:lstStyle/>
+          <a:p>
+            <a:fld id="{6F4F2A7C-E896-4C15-99D8-2B5BC94A4F36}" type="slidenum">
+              <a:rPr lang="de-DE" smtClean="0"/>
+              <a:t>5</a:t>
+            </a:fld>
+            <a:endParaRPr lang="de-DE"/>
+          </a:p>
+        </p:txBody>
+      </p:sp>
+    </p:spTree>
+    <p:extLst>
+      <p:ext uri="{BB962C8B-B14F-4D97-AF65-F5344CB8AC3E}">
+        <p14:creationId xmlns:p14="http://schemas.microsoft.com/office/powerpoint/2010/main" val="1600063247"/>
+      </p:ext>
+    </p:extLst>
+  </p:cSld>
+  <p:clrMapOvr>
+    <a:masterClrMapping/>
+  </p:clrMapOvr>
+</p:notes>
 </file>
 
 <file path=ppt/slideLayouts/slideLayout1.xml><?xml version="1.0" encoding="utf-8"?>
@@ -3901,6 +3986,455 @@
           <a:chExt cx="0" cy="0"/>
         </a:xfrm>
       </p:grpSpPr>
+      <p:pic>
+        <p:nvPicPr>
+          <p:cNvPr id="6" name="Inhaltsplatzhalter 5">
+            <a:extLst>
+              <a:ext uri="{FF2B5EF4-FFF2-40B4-BE49-F238E27FC236}">
+                <a16:creationId xmlns:a16="http://schemas.microsoft.com/office/drawing/2014/main" id="{DCB01375-5ADA-41CC-B81B-7F447A1D340A}"/>
+              </a:ext>
+            </a:extLst>
+          </p:cNvPr>
+          <p:cNvPicPr>
+            <a:picLocks noGrp="1" noChangeAspect="1"/>
+          </p:cNvPicPr>
+          <p:nvPr>
+            <p:ph idx="1"/>
+          </p:nvPr>
+        </p:nvPicPr>
+        <p:blipFill>
+          <a:blip r:embed="rId3">
+            <a:extLst>
+              <a:ext uri="{28A0092B-C50C-407E-A947-70E740481C1C}">
+                <a14:useLocalDpi xmlns:a14="http://schemas.microsoft.com/office/drawing/2010/main" val="0"/>
+              </a:ext>
+            </a:extLst>
+          </a:blip>
+          <a:stretch>
+            <a:fillRect/>
+          </a:stretch>
+        </p:blipFill>
+        <p:spPr>
+          <a:xfrm>
+            <a:off x="7108243" y="992076"/>
+            <a:ext cx="1784238" cy="3055267"/>
+          </a:xfrm>
+        </p:spPr>
+      </p:pic>
+      <p:sp>
+        <p:nvSpPr>
+          <p:cNvPr id="3" name="Foliennummernplatzhalter 2">
+            <a:extLst>
+              <a:ext uri="{FF2B5EF4-FFF2-40B4-BE49-F238E27FC236}">
+                <a16:creationId xmlns:a16="http://schemas.microsoft.com/office/drawing/2014/main" id="{657F6126-5BBF-4965-ACA4-09015B3C5159}"/>
+              </a:ext>
+            </a:extLst>
+          </p:cNvPr>
+          <p:cNvSpPr>
+            <a:spLocks noGrp="1"/>
+          </p:cNvSpPr>
+          <p:nvPr>
+            <p:ph type="sldNum" sz="quarter" idx="12"/>
+          </p:nvPr>
+        </p:nvSpPr>
+        <p:spPr/>
+        <p:txBody>
+          <a:bodyPr/>
+          <a:lstStyle/>
+          <a:p>
+            <a:fld id="{29AD3987-26BA-49DC-BA24-72731371DC9F}" type="slidenum">
+              <a:rPr lang="de-DE" smtClean="0"/>
+              <a:t>5</a:t>
+            </a:fld>
+            <a:endParaRPr lang="de-DE" dirty="0"/>
+          </a:p>
+        </p:txBody>
+      </p:sp>
+      <p:sp>
+        <p:nvSpPr>
+          <p:cNvPr id="4" name="Titel 3">
+            <a:extLst>
+              <a:ext uri="{FF2B5EF4-FFF2-40B4-BE49-F238E27FC236}">
+                <a16:creationId xmlns:a16="http://schemas.microsoft.com/office/drawing/2014/main" id="{1028AE61-7CD1-43E6-BBD2-98C8601BA1A6}"/>
+              </a:ext>
+            </a:extLst>
+          </p:cNvPr>
+          <p:cNvSpPr>
+            <a:spLocks noGrp="1"/>
+          </p:cNvSpPr>
+          <p:nvPr>
+            <p:ph type="title"/>
+          </p:nvPr>
+        </p:nvSpPr>
+        <p:spPr/>
+        <p:txBody>
+          <a:bodyPr/>
+          <a:lstStyle/>
+          <a:p>
+            <a:r>
+              <a:rPr lang="de-DE" dirty="0"/>
+              <a:t>Data Collection</a:t>
+            </a:r>
+            <a:endParaRPr lang="en-DE" dirty="0"/>
+          </a:p>
+        </p:txBody>
+      </p:sp>
+      <p:pic>
+        <p:nvPicPr>
+          <p:cNvPr id="8" name="Grafik 7">
+            <a:extLst>
+              <a:ext uri="{FF2B5EF4-FFF2-40B4-BE49-F238E27FC236}">
+                <a16:creationId xmlns:a16="http://schemas.microsoft.com/office/drawing/2014/main" id="{BF88BCF2-51E6-4918-88BB-BD3F4F479504}"/>
+              </a:ext>
+            </a:extLst>
+          </p:cNvPr>
+          <p:cNvPicPr>
+            <a:picLocks noChangeAspect="1"/>
+          </p:cNvPicPr>
+          <p:nvPr/>
+        </p:nvPicPr>
+        <p:blipFill>
+          <a:blip r:embed="rId4">
+            <a:extLst>
+              <a:ext uri="{28A0092B-C50C-407E-A947-70E740481C1C}">
+                <a14:useLocalDpi xmlns:a14="http://schemas.microsoft.com/office/drawing/2010/main" val="0"/>
+              </a:ext>
+            </a:extLst>
+          </a:blip>
+          <a:stretch>
+            <a:fillRect/>
+          </a:stretch>
+        </p:blipFill>
+        <p:spPr>
+          <a:xfrm>
+            <a:off x="251474" y="992076"/>
+            <a:ext cx="1784238" cy="3055268"/>
+          </a:xfrm>
+          <a:prstGeom prst="rect">
+            <a:avLst/>
+          </a:prstGeom>
+        </p:spPr>
+      </p:pic>
+      <p:sp>
+        <p:nvSpPr>
+          <p:cNvPr id="9" name="Inhaltsplatzhalter 1">
+            <a:extLst>
+              <a:ext uri="{FF2B5EF4-FFF2-40B4-BE49-F238E27FC236}">
+                <a16:creationId xmlns:a16="http://schemas.microsoft.com/office/drawing/2014/main" id="{A111621C-A287-472E-B02D-77CB71285DA8}"/>
+              </a:ext>
+            </a:extLst>
+          </p:cNvPr>
+          <p:cNvSpPr txBox="1">
+            <a:spLocks/>
+          </p:cNvSpPr>
+          <p:nvPr/>
+        </p:nvSpPr>
+        <p:spPr>
+          <a:xfrm>
+            <a:off x="2267744" y="1202573"/>
+            <a:ext cx="4608512" cy="2844769"/>
+          </a:xfrm>
+          <a:prstGeom prst="rect">
+            <a:avLst/>
+          </a:prstGeom>
+        </p:spPr>
+        <p:txBody>
+          <a:bodyPr vert="horz" lIns="91440" tIns="45720" rIns="91440" bIns="45720" rtlCol="0">
+            <a:normAutofit/>
+          </a:bodyPr>
+          <a:lstStyle>
+            <a:lvl1pPr marL="342900" indent="-342900" algn="l" defTabSz="914400" rtl="0" eaLnBrk="1" latinLnBrk="0" hangingPunct="1">
+              <a:spcBef>
+                <a:spcPct val="20000"/>
+              </a:spcBef>
+              <a:buClr>
+                <a:srgbClr val="137CBE"/>
+              </a:buClr>
+              <a:buFont typeface="Wingdings" pitchFamily="2" charset="2"/>
+              <a:buChar char="§"/>
+              <a:defRPr sz="2000" kern="1200">
+                <a:solidFill>
+                  <a:schemeClr val="tx1"/>
+                </a:solidFill>
+                <a:latin typeface="+mn-lt"/>
+                <a:ea typeface="Segoe UI" pitchFamily="34" charset="0"/>
+                <a:cs typeface="Segoe UI" pitchFamily="34" charset="0"/>
+              </a:defRPr>
+            </a:lvl1pPr>
+            <a:lvl2pPr marL="742950" indent="-285750" algn="l" defTabSz="914400" rtl="0" eaLnBrk="1" latinLnBrk="0" hangingPunct="1">
+              <a:spcBef>
+                <a:spcPct val="20000"/>
+              </a:spcBef>
+              <a:buClr>
+                <a:srgbClr val="137CBE"/>
+              </a:buClr>
+              <a:buFont typeface="Wingdings" pitchFamily="2" charset="2"/>
+              <a:buChar char="§"/>
+              <a:defRPr sz="1800" kern="1200">
+                <a:solidFill>
+                  <a:schemeClr val="tx1"/>
+                </a:solidFill>
+                <a:latin typeface="+mn-lt"/>
+                <a:ea typeface="Segoe UI" pitchFamily="34" charset="0"/>
+                <a:cs typeface="Segoe UI" pitchFamily="34" charset="0"/>
+              </a:defRPr>
+            </a:lvl2pPr>
+            <a:lvl3pPr marL="1143000" indent="-228600" algn="l" defTabSz="914400" rtl="0" eaLnBrk="1" latinLnBrk="0" hangingPunct="1">
+              <a:spcBef>
+                <a:spcPct val="20000"/>
+              </a:spcBef>
+              <a:buClr>
+                <a:srgbClr val="137CBE"/>
+              </a:buClr>
+              <a:buFont typeface="Wingdings" pitchFamily="2" charset="2"/>
+              <a:buChar char="§"/>
+              <a:defRPr sz="1600" kern="1200">
+                <a:solidFill>
+                  <a:schemeClr val="tx1"/>
+                </a:solidFill>
+                <a:latin typeface="+mn-lt"/>
+                <a:ea typeface="Segoe UI" pitchFamily="34" charset="0"/>
+                <a:cs typeface="Segoe UI" pitchFamily="34" charset="0"/>
+              </a:defRPr>
+            </a:lvl3pPr>
+            <a:lvl4pPr marL="1600200" indent="-228600" algn="l" defTabSz="914400" rtl="0" eaLnBrk="1" latinLnBrk="0" hangingPunct="1">
+              <a:spcBef>
+                <a:spcPct val="20000"/>
+              </a:spcBef>
+              <a:buClr>
+                <a:srgbClr val="137CBE"/>
+              </a:buClr>
+              <a:buFont typeface="Wingdings" pitchFamily="2" charset="2"/>
+              <a:buChar char="§"/>
+              <a:defRPr sz="1400" kern="1200">
+                <a:solidFill>
+                  <a:schemeClr val="tx1"/>
+                </a:solidFill>
+                <a:latin typeface="+mn-lt"/>
+                <a:ea typeface="Segoe UI" pitchFamily="34" charset="0"/>
+                <a:cs typeface="Segoe UI" pitchFamily="34" charset="0"/>
+              </a:defRPr>
+            </a:lvl4pPr>
+            <a:lvl5pPr marL="2057400" indent="-228600" algn="l" defTabSz="914400" rtl="0" eaLnBrk="1" latinLnBrk="0" hangingPunct="1">
+              <a:spcBef>
+                <a:spcPct val="20000"/>
+              </a:spcBef>
+              <a:buClr>
+                <a:srgbClr val="137CBE"/>
+              </a:buClr>
+              <a:buFont typeface="Wingdings" pitchFamily="2" charset="2"/>
+              <a:buChar char="§"/>
+              <a:defRPr sz="1400" kern="1200">
+                <a:solidFill>
+                  <a:schemeClr val="tx1"/>
+                </a:solidFill>
+                <a:latin typeface="+mn-lt"/>
+                <a:ea typeface="Segoe UI" pitchFamily="34" charset="0"/>
+                <a:cs typeface="Segoe UI" pitchFamily="34" charset="0"/>
+              </a:defRPr>
+            </a:lvl5pPr>
+            <a:lvl6pPr marL="2514600" indent="-228600" algn="l" defTabSz="914400" rtl="0" eaLnBrk="1" latinLnBrk="0" hangingPunct="1">
+              <a:spcBef>
+                <a:spcPct val="20000"/>
+              </a:spcBef>
+              <a:buFont typeface="Arial" pitchFamily="34" charset="0"/>
+              <a:buChar char="•"/>
+              <a:defRPr sz="2000" kern="1200">
+                <a:solidFill>
+                  <a:schemeClr val="tx1"/>
+                </a:solidFill>
+                <a:latin typeface="+mn-lt"/>
+                <a:ea typeface="+mn-ea"/>
+                <a:cs typeface="+mn-cs"/>
+              </a:defRPr>
+            </a:lvl6pPr>
+            <a:lvl7pPr marL="2971800" indent="-228600" algn="l" defTabSz="914400" rtl="0" eaLnBrk="1" latinLnBrk="0" hangingPunct="1">
+              <a:spcBef>
+                <a:spcPct val="20000"/>
+              </a:spcBef>
+              <a:buFont typeface="Arial" pitchFamily="34" charset="0"/>
+              <a:buChar char="•"/>
+              <a:defRPr sz="2000" kern="1200">
+                <a:solidFill>
+                  <a:schemeClr val="tx1"/>
+                </a:solidFill>
+                <a:latin typeface="+mn-lt"/>
+                <a:ea typeface="+mn-ea"/>
+                <a:cs typeface="+mn-cs"/>
+              </a:defRPr>
+            </a:lvl7pPr>
+            <a:lvl8pPr marL="3429000" indent="-228600" algn="l" defTabSz="914400" rtl="0" eaLnBrk="1" latinLnBrk="0" hangingPunct="1">
+              <a:spcBef>
+                <a:spcPct val="20000"/>
+              </a:spcBef>
+              <a:buFont typeface="Arial" pitchFamily="34" charset="0"/>
+              <a:buChar char="•"/>
+              <a:defRPr sz="2000" kern="1200">
+                <a:solidFill>
+                  <a:schemeClr val="tx1"/>
+                </a:solidFill>
+                <a:latin typeface="+mn-lt"/>
+                <a:ea typeface="+mn-ea"/>
+                <a:cs typeface="+mn-cs"/>
+              </a:defRPr>
+            </a:lvl8pPr>
+            <a:lvl9pPr marL="3886200" indent="-228600" algn="l" defTabSz="914400" rtl="0" eaLnBrk="1" latinLnBrk="0" hangingPunct="1">
+              <a:spcBef>
+                <a:spcPct val="20000"/>
+              </a:spcBef>
+              <a:buFont typeface="Arial" pitchFamily="34" charset="0"/>
+              <a:buChar char="•"/>
+              <a:defRPr sz="2000" kern="1200">
+                <a:solidFill>
+                  <a:schemeClr val="tx1"/>
+                </a:solidFill>
+                <a:latin typeface="+mn-lt"/>
+                <a:ea typeface="+mn-ea"/>
+                <a:cs typeface="+mn-cs"/>
+              </a:defRPr>
+            </a:lvl9pPr>
+          </a:lstStyle>
+          <a:p>
+            <a:r>
+              <a:rPr lang="en-GB" dirty="0"/>
+              <a:t>Data is stored</a:t>
+            </a:r>
+          </a:p>
+          <a:p>
+            <a:r>
+              <a:rPr lang="en-GB" dirty="0"/>
+              <a:t>24.7 to 24.8 samples/second</a:t>
+            </a:r>
+          </a:p>
+          <a:p>
+            <a:r>
+              <a:rPr lang="en-GB" dirty="0"/>
+              <a:t>Some data is lost</a:t>
+            </a:r>
+          </a:p>
+          <a:p>
+            <a:pPr lvl="1"/>
+            <a:r>
+              <a:rPr lang="en-GB" dirty="0"/>
+              <a:t>&lt; 1%</a:t>
+            </a:r>
+          </a:p>
+          <a:p>
+            <a:pPr lvl="1"/>
+            <a:r>
+              <a:rPr lang="en-GB" dirty="0"/>
+              <a:t>DataStream is missing some characters</a:t>
+            </a:r>
+          </a:p>
+          <a:p>
+            <a:r>
+              <a:rPr lang="en-GB" dirty="0"/>
+              <a:t>Blob Detection in progress</a:t>
+            </a:r>
+          </a:p>
+        </p:txBody>
+      </p:sp>
+      <p:sp>
+        <p:nvSpPr>
+          <p:cNvPr id="2" name="Textfeld 1">
+            <a:extLst>
+              <a:ext uri="{FF2B5EF4-FFF2-40B4-BE49-F238E27FC236}">
+                <a16:creationId xmlns:a16="http://schemas.microsoft.com/office/drawing/2014/main" id="{9D45115C-98F8-49D0-970C-EBADEE769BE7}"/>
+              </a:ext>
+            </a:extLst>
+          </p:cNvPr>
+          <p:cNvSpPr txBox="1"/>
+          <p:nvPr/>
+        </p:nvSpPr>
+        <p:spPr>
+          <a:xfrm>
+            <a:off x="874929" y="4047342"/>
+            <a:ext cx="537327" cy="246221"/>
+          </a:xfrm>
+          <a:prstGeom prst="rect">
+            <a:avLst/>
+          </a:prstGeom>
+          <a:noFill/>
+        </p:spPr>
+        <p:txBody>
+          <a:bodyPr wrap="none" rtlCol="0">
+            <a:spAutoFit/>
+          </a:bodyPr>
+          <a:lstStyle/>
+          <a:p>
+            <a:r>
+              <a:rPr lang="de-DE" sz="1000" dirty="0"/>
+              <a:t>Finger</a:t>
+            </a:r>
+            <a:endParaRPr lang="en-DE" sz="1000" dirty="0"/>
+          </a:p>
+        </p:txBody>
+      </p:sp>
+      <p:sp>
+        <p:nvSpPr>
+          <p:cNvPr id="10" name="Textfeld 9">
+            <a:extLst>
+              <a:ext uri="{FF2B5EF4-FFF2-40B4-BE49-F238E27FC236}">
+                <a16:creationId xmlns:a16="http://schemas.microsoft.com/office/drawing/2014/main" id="{4024DB39-D154-4D6F-8B72-97B44DE46618}"/>
+              </a:ext>
+            </a:extLst>
+          </p:cNvPr>
+          <p:cNvSpPr txBox="1"/>
+          <p:nvPr/>
+        </p:nvSpPr>
+        <p:spPr>
+          <a:xfrm>
+            <a:off x="7688417" y="4047342"/>
+            <a:ext cx="623889" cy="246221"/>
+          </a:xfrm>
+          <a:prstGeom prst="rect">
+            <a:avLst/>
+          </a:prstGeom>
+          <a:noFill/>
+        </p:spPr>
+        <p:txBody>
+          <a:bodyPr wrap="none" rtlCol="0">
+            <a:spAutoFit/>
+          </a:bodyPr>
+          <a:lstStyle/>
+          <a:p>
+            <a:r>
+              <a:rPr lang="en-GB" sz="1000" dirty="0"/>
+              <a:t>Knuckle</a:t>
+            </a:r>
+          </a:p>
+        </p:txBody>
+      </p:sp>
+    </p:spTree>
+    <p:extLst>
+      <p:ext uri="{BB962C8B-B14F-4D97-AF65-F5344CB8AC3E}">
+        <p14:creationId xmlns:p14="http://schemas.microsoft.com/office/powerpoint/2010/main" val="937420597"/>
+      </p:ext>
+    </p:extLst>
+  </p:cSld>
+  <p:clrMapOvr>
+    <a:masterClrMapping/>
+  </p:clrMapOvr>
+</p:sld>
+</file>
+
+<file path=ppt/slides/slide6.xml><?xml version="1.0" encoding="utf-8"?>
+<p:sld xmlns:a="http://schemas.openxmlformats.org/drawingml/2006/main" xmlns:r="http://schemas.openxmlformats.org/officeDocument/2006/relationships" xmlns:p="http://schemas.openxmlformats.org/presentationml/2006/main">
+  <p:cSld>
+    <p:spTree>
+      <p:nvGrpSpPr>
+        <p:cNvPr id="1" name=""/>
+        <p:cNvGrpSpPr/>
+        <p:nvPr/>
+      </p:nvGrpSpPr>
+      <p:grpSpPr>
+        <a:xfrm>
+          <a:off x="0" y="0"/>
+          <a:ext cx="0" cy="0"/>
+          <a:chOff x="0" y="0"/>
+          <a:chExt cx="0" cy="0"/>
+        </a:xfrm>
+      </p:grpSpPr>
       <p:sp>
         <p:nvSpPr>
           <p:cNvPr id="2" name="Inhaltsplatzhalter 1">
@@ -4059,7 +4593,7 @@
           <a:p>
             <a:fld id="{29AD3987-26BA-49DC-BA24-72731371DC9F}" type="slidenum">
               <a:rPr lang="de-DE" smtClean="0"/>
-              <a:t>5</a:t>
+              <a:t>6</a:t>
             </a:fld>
             <a:endParaRPr lang="de-DE" dirty="0"/>
           </a:p>

</xml_diff>